<commit_message>
Added the diagram to cover page
</commit_message>
<xml_diff>
--- a/docs/HDX_DesignChallenge.pptx
+++ b/docs/HDX_DesignChallenge.pptx
@@ -3807,55 +3807,871 @@
         <p:spPr>
           <a:xfrm>
             <a:off x="2209800" y="276974"/>
-            <a:ext cx="7772400" cy="2387600"/>
+            <a:ext cx="7772400" cy="699210"/>
           </a:xfrm>
         </p:spPr>
         <p:txBody>
-          <a:bodyPr/>
+          <a:bodyPr>
+            <a:normAutofit fontScale="90000"/>
+          </a:bodyPr>
           <a:lstStyle/>
           <a:p>
             <a:r>
               <a:rPr lang="en-US" dirty="0"/>
               <a:t>HDX Design Challenge</a:t>
+            </a:r>
+          </a:p>
+        </p:txBody>
+      </p:sp>
+      <p:pic>
+        <p:nvPicPr>
+          <p:cNvPr id="6" name="Picture 5">
+            <a:extLst>
+              <a:ext uri="{FF2B5EF4-FFF2-40B4-BE49-F238E27FC236}">
+                <a16:creationId xmlns:a16="http://schemas.microsoft.com/office/drawing/2014/main" id="{8BD66CFE-1E7E-3648-8E36-3590446F69E2}"/>
+              </a:ext>
+            </a:extLst>
+          </p:cNvPr>
+          <p:cNvPicPr>
+            <a:picLocks noChangeAspect="1"/>
+          </p:cNvPicPr>
+          <p:nvPr/>
+        </p:nvPicPr>
+        <p:blipFill rotWithShape="1">
+          <a:blip r:embed="rId3" cstate="print">
+            <a:extLst>
+              <a:ext uri="{28A0092B-C50C-407E-A947-70E740481C1C}">
+                <a14:useLocalDpi xmlns:a14="http://schemas.microsoft.com/office/drawing/2010/main"/>
+              </a:ext>
+            </a:extLst>
+          </a:blip>
+          <a:srcRect/>
+          <a:stretch/>
+        </p:blipFill>
+        <p:spPr>
+          <a:xfrm>
+            <a:off x="0" y="1346886"/>
+            <a:ext cx="12195599" cy="3163329"/>
+          </a:xfrm>
+          <a:prstGeom prst="rect">
+            <a:avLst/>
+          </a:prstGeom>
+        </p:spPr>
+      </p:pic>
+      <p:sp>
+        <p:nvSpPr>
+          <p:cNvPr id="7" name="Rectangle 6">
+            <a:extLst>
+              <a:ext uri="{FF2B5EF4-FFF2-40B4-BE49-F238E27FC236}">
+                <a16:creationId xmlns:a16="http://schemas.microsoft.com/office/drawing/2014/main" id="{32FE5C25-82F3-124A-AE8B-60455CF388D3}"/>
+              </a:ext>
+            </a:extLst>
+          </p:cNvPr>
+          <p:cNvSpPr/>
+          <p:nvPr/>
+        </p:nvSpPr>
+        <p:spPr>
+          <a:xfrm>
+            <a:off x="4569680" y="1433383"/>
+            <a:ext cx="920137" cy="926760"/>
+          </a:xfrm>
+          <a:prstGeom prst="rect">
+            <a:avLst/>
+          </a:prstGeom>
+          <a:solidFill>
+            <a:srgbClr val="027EB1"/>
+          </a:solidFill>
+        </p:spPr>
+        <p:style>
+          <a:lnRef idx="2">
+            <a:schemeClr val="accent1">
+              <a:shade val="50000"/>
+            </a:schemeClr>
+          </a:lnRef>
+          <a:fillRef idx="1">
+            <a:schemeClr val="accent1"/>
+          </a:fillRef>
+          <a:effectRef idx="0">
+            <a:schemeClr val="accent1"/>
+          </a:effectRef>
+          <a:fontRef idx="minor">
+            <a:schemeClr val="lt1"/>
+          </a:fontRef>
+        </p:style>
+        <p:txBody>
+          <a:bodyPr rtlCol="0" anchor="ctr"/>
+          <a:lstStyle/>
+          <a:p>
+            <a:pPr algn="ctr"/>
+            <a:r>
+              <a:rPr lang="en-TW" sz="1000" dirty="0"/>
+              <a:t>Abstract Specifications</a:t>
             </a:r>
           </a:p>
         </p:txBody>
       </p:sp>
       <p:sp>
         <p:nvSpPr>
-          <p:cNvPr id="3" name="Subtitle 2">
-            <a:extLst>
-              <a:ext uri="{FF2B5EF4-FFF2-40B4-BE49-F238E27FC236}">
-                <a16:creationId xmlns:a16="http://schemas.microsoft.com/office/drawing/2014/main" id="{98026DE4-E3B3-134D-8D8D-BE11315682A5}"/>
-              </a:ext>
-            </a:extLst>
-          </p:cNvPr>
-          <p:cNvSpPr>
-            <a:spLocks noGrp="1"/>
-          </p:cNvSpPr>
-          <p:nvPr>
-            <p:ph type="subTitle" idx="1"/>
-          </p:nvPr>
+          <p:cNvPr id="8" name="Rectangle 7">
+            <a:extLst>
+              <a:ext uri="{FF2B5EF4-FFF2-40B4-BE49-F238E27FC236}">
+                <a16:creationId xmlns:a16="http://schemas.microsoft.com/office/drawing/2014/main" id="{E4947481-93AA-B540-A866-69744397FF9C}"/>
+              </a:ext>
+            </a:extLst>
+          </p:cNvPr>
+          <p:cNvSpPr/>
+          <p:nvPr/>
         </p:nvSpPr>
-        <p:spPr/>
+        <p:spPr>
+          <a:xfrm>
+            <a:off x="5570577" y="1445740"/>
+            <a:ext cx="920137" cy="914403"/>
+          </a:xfrm>
+          <a:prstGeom prst="rect">
+            <a:avLst/>
+          </a:prstGeom>
+          <a:solidFill>
+            <a:srgbClr val="005D7F"/>
+          </a:solidFill>
+        </p:spPr>
+        <p:style>
+          <a:lnRef idx="2">
+            <a:schemeClr val="accent1">
+              <a:shade val="50000"/>
+            </a:schemeClr>
+          </a:lnRef>
+          <a:fillRef idx="1">
+            <a:schemeClr val="accent1"/>
+          </a:fillRef>
+          <a:effectRef idx="0">
+            <a:schemeClr val="accent1"/>
+          </a:effectRef>
+          <a:fontRef idx="minor">
+            <a:schemeClr val="lt1"/>
+          </a:fontRef>
+        </p:style>
         <p:txBody>
-          <a:bodyPr>
-            <a:normAutofit/>
+          <a:bodyPr rtlCol="0" anchor="ctr"/>
+          <a:lstStyle/>
+          <a:p>
+            <a:pPr algn="ctr"/>
+            <a:r>
+              <a:rPr lang="en-TW" sz="1050" dirty="0"/>
+              <a:t>Concrete Resource</a:t>
+            </a:r>
+          </a:p>
+          <a:p>
+            <a:pPr algn="ctr"/>
+            <a:r>
+              <a:rPr lang="en-TW" sz="1050" dirty="0"/>
+              <a:t>Commitment</a:t>
+            </a:r>
+          </a:p>
+        </p:txBody>
+      </p:sp>
+      <p:sp>
+        <p:nvSpPr>
+          <p:cNvPr id="9" name="Rectangle 8">
+            <a:extLst>
+              <a:ext uri="{FF2B5EF4-FFF2-40B4-BE49-F238E27FC236}">
+                <a16:creationId xmlns:a16="http://schemas.microsoft.com/office/drawing/2014/main" id="{F9FF6E68-EDB1-904D-A7C1-886C36E79E30}"/>
+              </a:ext>
+            </a:extLst>
+          </p:cNvPr>
+          <p:cNvSpPr/>
+          <p:nvPr/>
+        </p:nvSpPr>
+        <p:spPr>
+          <a:xfrm>
+            <a:off x="3018465" y="2458997"/>
+            <a:ext cx="5004486" cy="926760"/>
+          </a:xfrm>
+          <a:prstGeom prst="rect">
+            <a:avLst/>
+          </a:prstGeom>
+          <a:solidFill>
+            <a:schemeClr val="accent1">
+              <a:alpha val="60000"/>
+            </a:schemeClr>
+          </a:solidFill>
+        </p:spPr>
+        <p:style>
+          <a:lnRef idx="2">
+            <a:schemeClr val="accent1">
+              <a:shade val="50000"/>
+            </a:schemeClr>
+          </a:lnRef>
+          <a:fillRef idx="1">
+            <a:schemeClr val="accent1"/>
+          </a:fillRef>
+          <a:effectRef idx="0">
+            <a:schemeClr val="accent1"/>
+          </a:effectRef>
+          <a:fontRef idx="minor">
+            <a:schemeClr val="lt1"/>
+          </a:fontRef>
+        </p:style>
+        <p:txBody>
+          <a:bodyPr rtlCol="0" anchor="ctr"/>
+          <a:lstStyle/>
+          <a:p>
+            <a:pPr algn="ctr"/>
+            <a:r>
+              <a:rPr lang="en-TW" dirty="0"/>
+              <a:t>Composable Workflow with </a:t>
+            </a:r>
+          </a:p>
+          <a:p>
+            <a:pPr algn="ctr"/>
+            <a:r>
+              <a:rPr lang="en-TW" dirty="0"/>
+              <a:t>a Unifiying Knowledge Base</a:t>
+            </a:r>
+          </a:p>
+        </p:txBody>
+      </p:sp>
+      <p:pic>
+        <p:nvPicPr>
+          <p:cNvPr id="10" name="Picture 9">
+            <a:extLst>
+              <a:ext uri="{FF2B5EF4-FFF2-40B4-BE49-F238E27FC236}">
+                <a16:creationId xmlns:a16="http://schemas.microsoft.com/office/drawing/2014/main" id="{6182FAE3-EED0-634F-B8DA-C4FD4BB4443D}"/>
+              </a:ext>
+            </a:extLst>
+          </p:cNvPr>
+          <p:cNvPicPr>
+            <a:picLocks noChangeAspect="1"/>
+          </p:cNvPicPr>
+          <p:nvPr/>
+        </p:nvPicPr>
+        <p:blipFill>
+          <a:blip r:embed="rId4"/>
+          <a:stretch>
+            <a:fillRect/>
+          </a:stretch>
+        </p:blipFill>
+        <p:spPr>
+          <a:xfrm>
+            <a:off x="9542045" y="2458997"/>
+            <a:ext cx="779262" cy="731164"/>
+          </a:xfrm>
+          <a:prstGeom prst="rect">
+            <a:avLst/>
+          </a:prstGeom>
+        </p:spPr>
+      </p:pic>
+      <p:pic>
+        <p:nvPicPr>
+          <p:cNvPr id="11" name="Picture 10">
+            <a:extLst>
+              <a:ext uri="{FF2B5EF4-FFF2-40B4-BE49-F238E27FC236}">
+                <a16:creationId xmlns:a16="http://schemas.microsoft.com/office/drawing/2014/main" id="{0327116C-9994-C745-893D-CCE4A2FB2A3E}"/>
+              </a:ext>
+            </a:extLst>
+          </p:cNvPr>
+          <p:cNvPicPr>
+            <a:picLocks noChangeAspect="1"/>
+          </p:cNvPicPr>
+          <p:nvPr/>
+        </p:nvPicPr>
+        <p:blipFill>
+          <a:blip r:embed="rId5" cstate="print">
+            <a:extLst>
+              <a:ext uri="{28A0092B-C50C-407E-A947-70E740481C1C}">
+                <a14:useLocalDpi xmlns:a14="http://schemas.microsoft.com/office/drawing/2010/main"/>
+              </a:ext>
+            </a:extLst>
+          </a:blip>
+          <a:stretch>
+            <a:fillRect/>
+          </a:stretch>
+        </p:blipFill>
+        <p:spPr>
+          <a:xfrm>
+            <a:off x="1482397" y="2397229"/>
+            <a:ext cx="839683" cy="792174"/>
+          </a:xfrm>
+          <a:prstGeom prst="rect">
+            <a:avLst/>
+          </a:prstGeom>
+        </p:spPr>
+      </p:pic>
+      <p:sp>
+        <p:nvSpPr>
+          <p:cNvPr id="12" name="TextBox 11">
+            <a:extLst>
+              <a:ext uri="{FF2B5EF4-FFF2-40B4-BE49-F238E27FC236}">
+                <a16:creationId xmlns:a16="http://schemas.microsoft.com/office/drawing/2014/main" id="{E4738F13-B1CD-4C4C-AD54-6EAA6619B919}"/>
+              </a:ext>
+            </a:extLst>
+          </p:cNvPr>
+          <p:cNvSpPr txBox="1"/>
+          <p:nvPr/>
+        </p:nvSpPr>
+        <p:spPr>
+          <a:xfrm>
+            <a:off x="765925" y="3016425"/>
+            <a:ext cx="2252540" cy="369332"/>
+          </a:xfrm>
+          <a:prstGeom prst="rect">
+            <a:avLst/>
+          </a:prstGeom>
+          <a:noFill/>
+        </p:spPr>
+        <p:txBody>
+          <a:bodyPr wrap="none" rtlCol="0">
+            <a:spAutoFit/>
           </a:bodyPr>
           <a:lstStyle/>
           <a:p>
-            <a:r>
-              <a:rPr lang="en-US" dirty="0"/>
-              <a:t>Creating a sustainable digital workflow</a:t>
-            </a:r>
-          </a:p>
-          <a:p>
-            <a:endParaRPr lang="en-US" dirty="0"/>
-          </a:p>
-          <a:p>
-            <a:r>
-              <a:rPr lang="en-US" dirty="0"/>
-              <a:t>A future of self-contained learning systems: robustness and flexibility</a:t>
+            <a:pPr algn="ctr"/>
+            <a:r>
+              <a:rPr lang="en-TW" sz="900" dirty="0">
+                <a:solidFill>
+                  <a:schemeClr val="bg2">
+                    <a:lumMod val="75000"/>
+                  </a:schemeClr>
+                </a:solidFill>
+              </a:rPr>
+              <a:t>Phabricator </a:t>
+            </a:r>
+          </a:p>
+          <a:p>
+            <a:pPr algn="ctr"/>
+            <a:r>
+              <a:rPr lang="en-TW" sz="900" dirty="0">
+                <a:solidFill>
+                  <a:schemeClr val="bg2">
+                    <a:lumMod val="75000"/>
+                  </a:schemeClr>
+                </a:solidFill>
+              </a:rPr>
+              <a:t>(Web-based Project Management Software)</a:t>
+            </a:r>
+          </a:p>
+        </p:txBody>
+      </p:sp>
+      <p:sp>
+        <p:nvSpPr>
+          <p:cNvPr id="13" name="TextBox 12">
+            <a:extLst>
+              <a:ext uri="{FF2B5EF4-FFF2-40B4-BE49-F238E27FC236}">
+                <a16:creationId xmlns:a16="http://schemas.microsoft.com/office/drawing/2014/main" id="{7B478C15-2223-E54D-8288-FFC80FA06EC2}"/>
+              </a:ext>
+            </a:extLst>
+          </p:cNvPr>
+          <p:cNvSpPr txBox="1"/>
+          <p:nvPr/>
+        </p:nvSpPr>
+        <p:spPr>
+          <a:xfrm>
+            <a:off x="8850294" y="3201091"/>
+            <a:ext cx="2162773" cy="230832"/>
+          </a:xfrm>
+          <a:prstGeom prst="rect">
+            <a:avLst/>
+          </a:prstGeom>
+          <a:noFill/>
+        </p:spPr>
+        <p:txBody>
+          <a:bodyPr wrap="none" rtlCol="0">
+            <a:spAutoFit/>
+          </a:bodyPr>
+          <a:lstStyle/>
+          <a:p>
+            <a:pPr algn="ctr"/>
+            <a:r>
+              <a:rPr lang="en-TW" sz="900" dirty="0">
+                <a:solidFill>
+                  <a:schemeClr val="bg2">
+                    <a:lumMod val="75000"/>
+                  </a:schemeClr>
+                </a:solidFill>
+              </a:rPr>
+              <a:t>(Web-based  Knowledge Storage Solution)</a:t>
+            </a:r>
+          </a:p>
+        </p:txBody>
+      </p:sp>
+      <p:sp>
+        <p:nvSpPr>
+          <p:cNvPr id="14" name="Rectangle 13">
+            <a:extLst>
+              <a:ext uri="{FF2B5EF4-FFF2-40B4-BE49-F238E27FC236}">
+                <a16:creationId xmlns:a16="http://schemas.microsoft.com/office/drawing/2014/main" id="{533D01C6-8DC6-784B-B89B-048327E73A33}"/>
+              </a:ext>
+            </a:extLst>
+          </p:cNvPr>
+          <p:cNvSpPr/>
+          <p:nvPr/>
+        </p:nvSpPr>
+        <p:spPr>
+          <a:xfrm>
+            <a:off x="566090" y="3471201"/>
+            <a:ext cx="9915855" cy="926760"/>
+          </a:xfrm>
+          <a:prstGeom prst="rect">
+            <a:avLst/>
+          </a:prstGeom>
+          <a:solidFill>
+            <a:schemeClr val="accent1">
+              <a:alpha val="60000"/>
+            </a:schemeClr>
+          </a:solidFill>
+        </p:spPr>
+        <p:style>
+          <a:lnRef idx="2">
+            <a:schemeClr val="accent1">
+              <a:shade val="50000"/>
+            </a:schemeClr>
+          </a:lnRef>
+          <a:fillRef idx="1">
+            <a:schemeClr val="accent1"/>
+          </a:fillRef>
+          <a:effectRef idx="0">
+            <a:schemeClr val="accent1"/>
+          </a:effectRef>
+          <a:fontRef idx="minor">
+            <a:schemeClr val="lt1"/>
+          </a:fontRef>
+        </p:style>
+        <p:txBody>
+          <a:bodyPr rtlCol="0" anchor="ctr"/>
+          <a:lstStyle/>
+          <a:p>
+            <a:pPr algn="ctr"/>
+            <a:r>
+              <a:rPr lang="en-TW" dirty="0"/>
+              <a:t>Low Entry Barrier to all kinds of Stakeholders with Political, Economic, Cultural interests…</a:t>
+            </a:r>
+          </a:p>
+        </p:txBody>
+      </p:sp>
+      <p:pic>
+        <p:nvPicPr>
+          <p:cNvPr id="15" name="Picture 14">
+            <a:extLst>
+              <a:ext uri="{FF2B5EF4-FFF2-40B4-BE49-F238E27FC236}">
+                <a16:creationId xmlns:a16="http://schemas.microsoft.com/office/drawing/2014/main" id="{3D2682C7-94BF-4744-88EF-C97BB0620D90}"/>
+              </a:ext>
+            </a:extLst>
+          </p:cNvPr>
+          <p:cNvPicPr>
+            <a:picLocks noChangeAspect="1"/>
+          </p:cNvPicPr>
+          <p:nvPr/>
+        </p:nvPicPr>
+        <p:blipFill rotWithShape="1">
+          <a:blip r:embed="rId6" cstate="print">
+            <a:extLst>
+              <a:ext uri="{28A0092B-C50C-407E-A947-70E740481C1C}">
+                <a14:useLocalDpi xmlns:a14="http://schemas.microsoft.com/office/drawing/2010/main"/>
+              </a:ext>
+            </a:extLst>
+          </a:blip>
+          <a:srcRect/>
+          <a:stretch/>
+        </p:blipFill>
+        <p:spPr>
+          <a:xfrm>
+            <a:off x="9505807" y="4576250"/>
+            <a:ext cx="920138" cy="1009542"/>
+          </a:xfrm>
+          <a:prstGeom prst="rect">
+            <a:avLst/>
+          </a:prstGeom>
+        </p:spPr>
+      </p:pic>
+      <p:pic>
+        <p:nvPicPr>
+          <p:cNvPr id="16" name="Picture 15">
+            <a:extLst>
+              <a:ext uri="{FF2B5EF4-FFF2-40B4-BE49-F238E27FC236}">
+                <a16:creationId xmlns:a16="http://schemas.microsoft.com/office/drawing/2014/main" id="{4E811EE5-7959-464A-A0FF-1F2A2674E61C}"/>
+              </a:ext>
+            </a:extLst>
+          </p:cNvPr>
+          <p:cNvPicPr>
+            <a:picLocks noChangeAspect="1"/>
+          </p:cNvPicPr>
+          <p:nvPr/>
+        </p:nvPicPr>
+        <p:blipFill rotWithShape="1">
+          <a:blip r:embed="rId7" cstate="print">
+            <a:extLst>
+              <a:ext uri="{28A0092B-C50C-407E-A947-70E740481C1C}">
+                <a14:useLocalDpi xmlns:a14="http://schemas.microsoft.com/office/drawing/2010/main"/>
+              </a:ext>
+            </a:extLst>
+          </a:blip>
+          <a:srcRect/>
+          <a:stretch/>
+        </p:blipFill>
+        <p:spPr>
+          <a:xfrm>
+            <a:off x="2738745" y="4607490"/>
+            <a:ext cx="1062682" cy="973827"/>
+          </a:xfrm>
+          <a:prstGeom prst="rect">
+            <a:avLst/>
+          </a:prstGeom>
+        </p:spPr>
+      </p:pic>
+      <p:pic>
+        <p:nvPicPr>
+          <p:cNvPr id="17" name="Picture 16">
+            <a:extLst>
+              <a:ext uri="{FF2B5EF4-FFF2-40B4-BE49-F238E27FC236}">
+                <a16:creationId xmlns:a16="http://schemas.microsoft.com/office/drawing/2014/main" id="{19E1551D-AB1E-884F-B2D5-B7493EF56902}"/>
+              </a:ext>
+            </a:extLst>
+          </p:cNvPr>
+          <p:cNvPicPr>
+            <a:picLocks noChangeAspect="1"/>
+          </p:cNvPicPr>
+          <p:nvPr/>
+        </p:nvPicPr>
+        <p:blipFill rotWithShape="1">
+          <a:blip r:embed="rId8" cstate="print">
+            <a:extLst>
+              <a:ext uri="{28A0092B-C50C-407E-A947-70E740481C1C}">
+                <a14:useLocalDpi xmlns:a14="http://schemas.microsoft.com/office/drawing/2010/main"/>
+              </a:ext>
+            </a:extLst>
+          </a:blip>
+          <a:srcRect/>
+          <a:stretch/>
+        </p:blipFill>
+        <p:spPr>
+          <a:xfrm>
+            <a:off x="7376806" y="4559947"/>
+            <a:ext cx="925863" cy="1009542"/>
+          </a:xfrm>
+          <a:prstGeom prst="rect">
+            <a:avLst/>
+          </a:prstGeom>
+        </p:spPr>
+      </p:pic>
+      <p:pic>
+        <p:nvPicPr>
+          <p:cNvPr id="18" name="Picture 17">
+            <a:extLst>
+              <a:ext uri="{FF2B5EF4-FFF2-40B4-BE49-F238E27FC236}">
+                <a16:creationId xmlns:a16="http://schemas.microsoft.com/office/drawing/2014/main" id="{4D5D423F-BA31-C64C-BC13-D92556526591}"/>
+              </a:ext>
+            </a:extLst>
+          </p:cNvPr>
+          <p:cNvPicPr>
+            <a:picLocks noChangeAspect="1"/>
+          </p:cNvPicPr>
+          <p:nvPr/>
+        </p:nvPicPr>
+        <p:blipFill rotWithShape="1">
+          <a:blip r:embed="rId9" cstate="print">
+            <a:extLst>
+              <a:ext uri="{28A0092B-C50C-407E-A947-70E740481C1C}">
+                <a14:useLocalDpi xmlns:a14="http://schemas.microsoft.com/office/drawing/2010/main"/>
+              </a:ext>
+            </a:extLst>
+          </a:blip>
+          <a:srcRect/>
+          <a:stretch/>
+        </p:blipFill>
+        <p:spPr>
+          <a:xfrm>
+            <a:off x="5057776" y="4577801"/>
+            <a:ext cx="925864" cy="1009542"/>
+          </a:xfrm>
+          <a:prstGeom prst="rect">
+            <a:avLst/>
+          </a:prstGeom>
+        </p:spPr>
+      </p:pic>
+      <p:pic>
+        <p:nvPicPr>
+          <p:cNvPr id="19" name="Picture 18">
+            <a:extLst>
+              <a:ext uri="{FF2B5EF4-FFF2-40B4-BE49-F238E27FC236}">
+                <a16:creationId xmlns:a16="http://schemas.microsoft.com/office/drawing/2014/main" id="{8BEF873C-6FC9-3D45-8B02-1D451845BB44}"/>
+              </a:ext>
+            </a:extLst>
+          </p:cNvPr>
+          <p:cNvPicPr>
+            <a:picLocks noChangeAspect="1"/>
+          </p:cNvPicPr>
+          <p:nvPr/>
+        </p:nvPicPr>
+        <p:blipFill rotWithShape="1">
+          <a:blip r:embed="rId10" cstate="print">
+            <a:extLst>
+              <a:ext uri="{28A0092B-C50C-407E-A947-70E740481C1C}">
+                <a14:useLocalDpi xmlns:a14="http://schemas.microsoft.com/office/drawing/2010/main"/>
+              </a:ext>
+            </a:extLst>
+          </a:blip>
+          <a:srcRect/>
+          <a:stretch/>
+        </p:blipFill>
+        <p:spPr>
+          <a:xfrm>
+            <a:off x="562259" y="4595659"/>
+            <a:ext cx="920138" cy="1012204"/>
+          </a:xfrm>
+          <a:prstGeom prst="rect">
+            <a:avLst/>
+          </a:prstGeom>
+        </p:spPr>
+      </p:pic>
+      <p:sp>
+        <p:nvSpPr>
+          <p:cNvPr id="20" name="TextBox 19">
+            <a:extLst>
+              <a:ext uri="{FF2B5EF4-FFF2-40B4-BE49-F238E27FC236}">
+                <a16:creationId xmlns:a16="http://schemas.microsoft.com/office/drawing/2014/main" id="{8D5ABD1E-737F-D345-8BD9-C5589978B772}"/>
+              </a:ext>
+            </a:extLst>
+          </p:cNvPr>
+          <p:cNvSpPr txBox="1"/>
+          <p:nvPr/>
+        </p:nvSpPr>
+        <p:spPr>
+          <a:xfrm>
+            <a:off x="196621" y="5607863"/>
+            <a:ext cx="1651414" cy="430887"/>
+          </a:xfrm>
+          <a:prstGeom prst="rect">
+            <a:avLst/>
+          </a:prstGeom>
+          <a:noFill/>
+        </p:spPr>
+        <p:txBody>
+          <a:bodyPr wrap="none" rtlCol="0">
+            <a:spAutoFit/>
+          </a:bodyPr>
+          <a:lstStyle/>
+          <a:p>
+            <a:pPr algn="ctr"/>
+            <a:r>
+              <a:rPr lang="en-TW" sz="1100" dirty="0"/>
+              <a:t>Online Manual for Digital </a:t>
+            </a:r>
+          </a:p>
+          <a:p>
+            <a:pPr algn="ctr"/>
+            <a:r>
+              <a:rPr lang="en-TW" sz="1100" dirty="0"/>
+              <a:t>Workflow Collaboration</a:t>
+            </a:r>
+          </a:p>
+        </p:txBody>
+      </p:sp>
+      <p:sp>
+        <p:nvSpPr>
+          <p:cNvPr id="21" name="TextBox 20">
+            <a:extLst>
+              <a:ext uri="{FF2B5EF4-FFF2-40B4-BE49-F238E27FC236}">
+                <a16:creationId xmlns:a16="http://schemas.microsoft.com/office/drawing/2014/main" id="{87855281-120A-4747-BA64-F20823406934}"/>
+              </a:ext>
+            </a:extLst>
+          </p:cNvPr>
+          <p:cNvSpPr txBox="1"/>
+          <p:nvPr/>
+        </p:nvSpPr>
+        <p:spPr>
+          <a:xfrm>
+            <a:off x="2482855" y="5611005"/>
+            <a:ext cx="1574470" cy="430887"/>
+          </a:xfrm>
+          <a:prstGeom prst="rect">
+            <a:avLst/>
+          </a:prstGeom>
+          <a:noFill/>
+        </p:spPr>
+        <p:txBody>
+          <a:bodyPr wrap="none" rtlCol="0">
+            <a:spAutoFit/>
+          </a:bodyPr>
+          <a:lstStyle/>
+          <a:p>
+            <a:pPr algn="ctr"/>
+            <a:r>
+              <a:rPr lang="en-TW" sz="1100" dirty="0"/>
+              <a:t>Micro Credit System for </a:t>
+            </a:r>
+          </a:p>
+          <a:p>
+            <a:pPr algn="ctr"/>
+            <a:r>
+              <a:rPr lang="en-TW" sz="1100" dirty="0"/>
+              <a:t>Individual Contributions</a:t>
+            </a:r>
+          </a:p>
+        </p:txBody>
+      </p:sp>
+      <p:sp>
+        <p:nvSpPr>
+          <p:cNvPr id="22" name="TextBox 21">
+            <a:extLst>
+              <a:ext uri="{FF2B5EF4-FFF2-40B4-BE49-F238E27FC236}">
+                <a16:creationId xmlns:a16="http://schemas.microsoft.com/office/drawing/2014/main" id="{5BBACA6D-79B8-6643-B738-966A84AF8F5E}"/>
+              </a:ext>
+            </a:extLst>
+          </p:cNvPr>
+          <p:cNvSpPr txBox="1"/>
+          <p:nvPr/>
+        </p:nvSpPr>
+        <p:spPr>
+          <a:xfrm>
+            <a:off x="6715872" y="5619221"/>
+            <a:ext cx="2247731" cy="430887"/>
+          </a:xfrm>
+          <a:prstGeom prst="rect">
+            <a:avLst/>
+          </a:prstGeom>
+          <a:noFill/>
+        </p:spPr>
+        <p:txBody>
+          <a:bodyPr wrap="none" rtlCol="0">
+            <a:spAutoFit/>
+          </a:bodyPr>
+          <a:lstStyle/>
+          <a:p>
+            <a:pPr algn="ctr"/>
+            <a:r>
+              <a:rPr lang="en-TW" sz="1100" dirty="0"/>
+              <a:t>Mobile-Device Access</a:t>
+            </a:r>
+          </a:p>
+          <a:p>
+            <a:pPr algn="ctr"/>
+            <a:r>
+              <a:rPr lang="en-TW" sz="1100" dirty="0"/>
+              <a:t>to Synchronize Actions in Spacetime</a:t>
+            </a:r>
+          </a:p>
+        </p:txBody>
+      </p:sp>
+      <p:sp>
+        <p:nvSpPr>
+          <p:cNvPr id="23" name="TextBox 22">
+            <a:extLst>
+              <a:ext uri="{FF2B5EF4-FFF2-40B4-BE49-F238E27FC236}">
+                <a16:creationId xmlns:a16="http://schemas.microsoft.com/office/drawing/2014/main" id="{EEBF3A5E-07A0-A241-AD4C-4F2B59AC4809}"/>
+              </a:ext>
+            </a:extLst>
+          </p:cNvPr>
+          <p:cNvSpPr txBox="1"/>
+          <p:nvPr/>
+        </p:nvSpPr>
+        <p:spPr>
+          <a:xfrm>
+            <a:off x="4602828" y="5607863"/>
+            <a:ext cx="1835759" cy="430887"/>
+          </a:xfrm>
+          <a:prstGeom prst="rect">
+            <a:avLst/>
+          </a:prstGeom>
+          <a:noFill/>
+        </p:spPr>
+        <p:txBody>
+          <a:bodyPr wrap="none" rtlCol="0">
+            <a:spAutoFit/>
+          </a:bodyPr>
+          <a:lstStyle/>
+          <a:p>
+            <a:pPr algn="ctr"/>
+            <a:r>
+              <a:rPr lang="en-TW" sz="1100" dirty="0"/>
+              <a:t>Cloud-based Workflow </a:t>
+            </a:r>
+          </a:p>
+          <a:p>
+            <a:pPr algn="ctr"/>
+            <a:r>
+              <a:rPr lang="en-TW" sz="1100" dirty="0"/>
+              <a:t>to Maximize Network Effects</a:t>
+            </a:r>
+          </a:p>
+        </p:txBody>
+      </p:sp>
+      <p:sp>
+        <p:nvSpPr>
+          <p:cNvPr id="24" name="TextBox 23">
+            <a:extLst>
+              <a:ext uri="{FF2B5EF4-FFF2-40B4-BE49-F238E27FC236}">
+                <a16:creationId xmlns:a16="http://schemas.microsoft.com/office/drawing/2014/main" id="{91A2B163-11D8-3549-8A46-38410FCBCF4E}"/>
+              </a:ext>
+            </a:extLst>
+          </p:cNvPr>
+          <p:cNvSpPr txBox="1"/>
+          <p:nvPr/>
+        </p:nvSpPr>
+        <p:spPr>
+          <a:xfrm>
+            <a:off x="9097134" y="5607862"/>
+            <a:ext cx="1665841" cy="430887"/>
+          </a:xfrm>
+          <a:prstGeom prst="rect">
+            <a:avLst/>
+          </a:prstGeom>
+          <a:noFill/>
+        </p:spPr>
+        <p:txBody>
+          <a:bodyPr wrap="none" rtlCol="0">
+            <a:spAutoFit/>
+          </a:bodyPr>
+          <a:lstStyle/>
+          <a:p>
+            <a:pPr algn="ctr"/>
+            <a:r>
+              <a:rPr lang="en-TW" sz="1100" dirty="0"/>
+              <a:t>Asset exchange</a:t>
+            </a:r>
+          </a:p>
+          <a:p>
+            <a:pPr algn="ctr"/>
+            <a:r>
+              <a:rPr lang="en-US" sz="1100" dirty="0"/>
+              <a:t>t</a:t>
+            </a:r>
+            <a:r>
+              <a:rPr lang="en-TW" sz="1100" dirty="0"/>
+              <a:t>hrough Digital Signatures</a:t>
+            </a:r>
+          </a:p>
+        </p:txBody>
+      </p:sp>
+      <p:sp>
+        <p:nvSpPr>
+          <p:cNvPr id="25" name="TextBox 24">
+            <a:extLst>
+              <a:ext uri="{FF2B5EF4-FFF2-40B4-BE49-F238E27FC236}">
+                <a16:creationId xmlns:a16="http://schemas.microsoft.com/office/drawing/2014/main" id="{83232EBF-1C68-2B4A-8884-84186C9E6C9F}"/>
+              </a:ext>
+            </a:extLst>
+          </p:cNvPr>
+          <p:cNvSpPr txBox="1"/>
+          <p:nvPr/>
+        </p:nvSpPr>
+        <p:spPr>
+          <a:xfrm>
+            <a:off x="3892378" y="6297805"/>
+            <a:ext cx="4764509" cy="369332"/>
+          </a:xfrm>
+          <a:prstGeom prst="rect">
+            <a:avLst/>
+          </a:prstGeom>
+          <a:noFill/>
+        </p:spPr>
+        <p:txBody>
+          <a:bodyPr wrap="none" rtlCol="0">
+            <a:spAutoFit/>
+          </a:bodyPr>
+          <a:lstStyle/>
+          <a:p>
+            <a:r>
+              <a:rPr lang="en-TW" dirty="0"/>
+              <a:t>Piloting the Pilot HDX 2021 Certification Program</a:t>
             </a:r>
           </a:p>
         </p:txBody>

</xml_diff>

<commit_message>
Added the secret sauce slide
</commit_message>
<xml_diff>
--- a/docs/HDX_DesignChallenge.pptx
+++ b/docs/HDX_DesignChallenge.pptx
@@ -5,7 +5,7 @@
     <p:sldMasterId id="2147483648" r:id="rId1"/>
   </p:sldMasterIdLst>
   <p:notesMasterIdLst>
-    <p:notesMasterId r:id="rId12"/>
+    <p:notesMasterId r:id="rId13"/>
   </p:notesMasterIdLst>
   <p:sldIdLst>
     <p:sldId id="757" r:id="rId2"/>
@@ -17,7 +17,8 @@
     <p:sldId id="762" r:id="rId8"/>
     <p:sldId id="763" r:id="rId9"/>
     <p:sldId id="760" r:id="rId10"/>
-    <p:sldId id="755" r:id="rId11"/>
+    <p:sldId id="765" r:id="rId11"/>
+    <p:sldId id="755" r:id="rId12"/>
   </p:sldIdLst>
   <p:sldSz cx="12192000" cy="6858000"/>
   <p:notesSz cx="6858000" cy="9144000"/>
@@ -116,6 +117,11 @@
       </a:defRPr>
     </a:lvl9pPr>
   </p:defaultTextStyle>
+  <p:extLst>
+    <p:ext uri="{EFAFB233-063F-42B5-8137-9DF3F51BA10A}">
+      <p15:sldGuideLst xmlns:p15="http://schemas.microsoft.com/office/powerpoint/2012/main"/>
+    </p:ext>
+  </p:extLst>
 </p:presentation>
 </file>
 
@@ -4690,6 +4696,545 @@
 </file>
 
 <file path=ppt/slides/slide10.xml><?xml version="1.0" encoding="utf-8"?>
+<p:sld xmlns:a="http://schemas.openxmlformats.org/drawingml/2006/main" xmlns:r="http://schemas.openxmlformats.org/officeDocument/2006/relationships" xmlns:p="http://schemas.openxmlformats.org/presentationml/2006/main">
+  <p:cSld>
+    <p:spTree>
+      <p:nvGrpSpPr>
+        <p:cNvPr id="1" name=""/>
+        <p:cNvGrpSpPr/>
+        <p:nvPr/>
+      </p:nvGrpSpPr>
+      <p:grpSpPr>
+        <a:xfrm>
+          <a:off x="0" y="0"/>
+          <a:ext cx="0" cy="0"/>
+          <a:chOff x="0" y="0"/>
+          <a:chExt cx="0" cy="0"/>
+        </a:xfrm>
+      </p:grpSpPr>
+      <p:sp>
+        <p:nvSpPr>
+          <p:cNvPr id="2" name="Title 1">
+            <a:extLst>
+              <a:ext uri="{FF2B5EF4-FFF2-40B4-BE49-F238E27FC236}">
+                <a16:creationId xmlns:a16="http://schemas.microsoft.com/office/drawing/2014/main" id="{A9106EA3-4C41-43C3-A0ED-D72999C31ED8}"/>
+              </a:ext>
+            </a:extLst>
+          </p:cNvPr>
+          <p:cNvSpPr>
+            <a:spLocks noGrp="1"/>
+          </p:cNvSpPr>
+          <p:nvPr>
+            <p:ph type="title"/>
+          </p:nvPr>
+        </p:nvSpPr>
+        <p:spPr>
+          <a:xfrm>
+            <a:off x="2152650" y="1"/>
+            <a:ext cx="7886700" cy="1325563"/>
+          </a:xfrm>
+        </p:spPr>
+        <p:txBody>
+          <a:bodyPr>
+            <a:normAutofit/>
+          </a:bodyPr>
+          <a:lstStyle/>
+          <a:p>
+            <a:pPr algn="ctr"/>
+            <a:r>
+              <a:rPr lang="en-US" sz="3600" dirty="0">
+                <a:latin typeface="+mn-lt"/>
+              </a:rPr>
+              <a:t>HDX Secret Sauce: Separation of Requirement and Implementation</a:t>
+            </a:r>
+          </a:p>
+        </p:txBody>
+      </p:sp>
+      <p:sp>
+        <p:nvSpPr>
+          <p:cNvPr id="3" name="Content Placeholder 2">
+            <a:extLst>
+              <a:ext uri="{FF2B5EF4-FFF2-40B4-BE49-F238E27FC236}">
+                <a16:creationId xmlns:a16="http://schemas.microsoft.com/office/drawing/2014/main" id="{DE762BB2-969B-4548-B058-AF192EFBB4CD}"/>
+              </a:ext>
+            </a:extLst>
+          </p:cNvPr>
+          <p:cNvSpPr>
+            <a:spLocks noGrp="1"/>
+          </p:cNvSpPr>
+          <p:nvPr>
+            <p:ph idx="1"/>
+          </p:nvPr>
+        </p:nvSpPr>
+        <p:spPr>
+          <a:xfrm>
+            <a:off x="2152650" y="1185545"/>
+            <a:ext cx="7886700" cy="5443855"/>
+          </a:xfrm>
+        </p:spPr>
+        <p:txBody>
+          <a:bodyPr>
+            <a:normAutofit fontScale="92500" lnSpcReduction="10000"/>
+          </a:bodyPr>
+          <a:lstStyle/>
+          <a:p>
+            <a:pPr marL="0" indent="0" algn="just">
+              <a:lnSpc>
+                <a:spcPct val="110000"/>
+              </a:lnSpc>
+              <a:spcAft>
+                <a:spcPts val="450"/>
+              </a:spcAft>
+              <a:buNone/>
+            </a:pPr>
+            <a:r>
+              <a:rPr lang="en-US" sz="2400" dirty="0">
+                <a:solidFill>
+                  <a:srgbClr val="000000"/>
+                </a:solidFill>
+                <a:latin typeface="Montserrat Light" panose="00000400000000000000" pitchFamily="50" charset="0"/>
+                <a:ea typeface="Calibri" panose="020F0502020204030204" pitchFamily="34" charset="0"/>
+                <a:cs typeface="Calibri" panose="020F0502020204030204" pitchFamily="34" charset="0"/>
+              </a:rPr>
+              <a:t>A foundational principle of digital workflow design is to separate Requirement from Implementation.</a:t>
+            </a:r>
+          </a:p>
+          <a:p>
+            <a:pPr marL="457200" indent="-457200" algn="just">
+              <a:lnSpc>
+                <a:spcPct val="110000"/>
+              </a:lnSpc>
+              <a:spcAft>
+                <a:spcPts val="450"/>
+              </a:spcAft>
+              <a:buFont typeface="+mj-lt"/>
+              <a:buAutoNum type="arabicPeriod"/>
+            </a:pPr>
+            <a:r>
+              <a:rPr lang="en-US" sz="2400" dirty="0">
+                <a:solidFill>
+                  <a:srgbClr val="000000"/>
+                </a:solidFill>
+                <a:latin typeface="Montserrat Light" panose="00000400000000000000" pitchFamily="50" charset="0"/>
+                <a:ea typeface="Calibri" panose="020F0502020204030204" pitchFamily="34" charset="0"/>
+                <a:cs typeface="Calibri" panose="020F0502020204030204" pitchFamily="34" charset="0"/>
+              </a:rPr>
+              <a:t>This principle helps keep ”requirements” focused on logical properties of workflow, isolate interest conflicts that will naturally occur in real projects (Grand Challenges)</a:t>
+            </a:r>
+          </a:p>
+          <a:p>
+            <a:pPr marL="457200" indent="-457200" algn="just">
+              <a:lnSpc>
+                <a:spcPct val="110000"/>
+              </a:lnSpc>
+              <a:spcAft>
+                <a:spcPts val="450"/>
+              </a:spcAft>
+              <a:buFont typeface="+mj-lt"/>
+              <a:buAutoNum type="arabicPeriod"/>
+            </a:pPr>
+            <a:r>
+              <a:rPr lang="en-US" sz="2400" dirty="0">
+                <a:solidFill>
+                  <a:srgbClr val="000000"/>
+                </a:solidFill>
+                <a:latin typeface="Montserrat Light" panose="00000400000000000000" pitchFamily="50" charset="0"/>
+                <a:ea typeface="Calibri" panose="020F0502020204030204" pitchFamily="34" charset="0"/>
+                <a:cs typeface="Calibri" panose="020F0502020204030204" pitchFamily="34" charset="0"/>
+              </a:rPr>
+              <a:t>The isolation helps keep requirements to be encoded in a vocabulary independent of specific applications  </a:t>
+            </a:r>
+          </a:p>
+          <a:p>
+            <a:pPr marL="457200" indent="-457200" algn="just">
+              <a:lnSpc>
+                <a:spcPct val="110000"/>
+              </a:lnSpc>
+              <a:spcAft>
+                <a:spcPts val="450"/>
+              </a:spcAft>
+              <a:buFont typeface="+mj-lt"/>
+              <a:buAutoNum type="arabicPeriod"/>
+            </a:pPr>
+            <a:r>
+              <a:rPr lang="en-US" sz="2400" dirty="0">
+                <a:solidFill>
+                  <a:srgbClr val="000000"/>
+                </a:solidFill>
+                <a:latin typeface="Montserrat Light" panose="00000400000000000000" pitchFamily="50" charset="0"/>
+                <a:ea typeface="Calibri" panose="020F0502020204030204" pitchFamily="34" charset="0"/>
+                <a:cs typeface="Calibri" panose="020F0502020204030204" pitchFamily="34" charset="0"/>
+              </a:rPr>
+              <a:t>Project Management is a general purpose skill, and should be independent of any applications.</a:t>
+            </a:r>
+          </a:p>
+          <a:p>
+            <a:pPr marL="457200" indent="-457200" algn="just">
+              <a:lnSpc>
+                <a:spcPct val="110000"/>
+              </a:lnSpc>
+              <a:spcAft>
+                <a:spcPts val="450"/>
+              </a:spcAft>
+              <a:buFont typeface="+mj-lt"/>
+              <a:buAutoNum type="arabicPeriod"/>
+            </a:pPr>
+            <a:r>
+              <a:rPr lang="en-US" sz="2400" dirty="0">
+                <a:solidFill>
+                  <a:srgbClr val="000000"/>
+                </a:solidFill>
+                <a:latin typeface="Montserrat Light" panose="00000400000000000000" pitchFamily="50" charset="0"/>
+                <a:ea typeface="Calibri" panose="020F0502020204030204" pitchFamily="34" charset="0"/>
+                <a:cs typeface="Calibri" panose="020F0502020204030204" pitchFamily="34" charset="0"/>
+              </a:rPr>
+              <a:t>This principle helps to share workflow management knowledge across application domains</a:t>
+            </a:r>
+          </a:p>
+          <a:p>
+            <a:pPr marL="457200" indent="-457200" algn="just">
+              <a:lnSpc>
+                <a:spcPct val="110000"/>
+              </a:lnSpc>
+              <a:spcAft>
+                <a:spcPts val="450"/>
+              </a:spcAft>
+              <a:buFont typeface="+mj-lt"/>
+              <a:buAutoNum type="arabicPeriod"/>
+            </a:pPr>
+            <a:r>
+              <a:rPr lang="en-US" sz="2400" dirty="0">
+                <a:solidFill>
+                  <a:srgbClr val="000000"/>
+                </a:solidFill>
+                <a:latin typeface="Montserrat Light" panose="00000400000000000000" pitchFamily="50" charset="0"/>
+                <a:ea typeface="Calibri" panose="020F0502020204030204" pitchFamily="34" charset="0"/>
+                <a:cs typeface="Calibri" panose="020F0502020204030204" pitchFamily="34" charset="0"/>
+              </a:rPr>
+              <a:t>All future KKB projects should leverage a common digital workflow requirement</a:t>
+            </a:r>
+          </a:p>
+        </p:txBody>
+      </p:sp>
+      <p:sp>
+        <p:nvSpPr>
+          <p:cNvPr id="4" name="Explosion 2 3">
+            <a:extLst>
+              <a:ext uri="{FF2B5EF4-FFF2-40B4-BE49-F238E27FC236}">
+                <a16:creationId xmlns:a16="http://schemas.microsoft.com/office/drawing/2014/main" id="{ADAC9683-4CCF-F340-933D-6AF70D2DC1BC}"/>
+              </a:ext>
+            </a:extLst>
+          </p:cNvPr>
+          <p:cNvSpPr/>
+          <p:nvPr/>
+        </p:nvSpPr>
+        <p:spPr>
+          <a:xfrm>
+            <a:off x="9854119" y="2013625"/>
+            <a:ext cx="2610256" cy="2830749"/>
+          </a:xfrm>
+          <a:prstGeom prst="irregularSeal2">
+            <a:avLst/>
+          </a:prstGeom>
+          <a:solidFill>
+            <a:srgbClr val="7030A0"/>
+          </a:solidFill>
+        </p:spPr>
+        <p:style>
+          <a:lnRef idx="2">
+            <a:schemeClr val="accent1">
+              <a:shade val="50000"/>
+            </a:schemeClr>
+          </a:lnRef>
+          <a:fillRef idx="1">
+            <a:schemeClr val="accent1"/>
+          </a:fillRef>
+          <a:effectRef idx="0">
+            <a:schemeClr val="accent1"/>
+          </a:effectRef>
+          <a:fontRef idx="minor">
+            <a:schemeClr val="lt1"/>
+          </a:fontRef>
+        </p:style>
+        <p:txBody>
+          <a:bodyPr rtlCol="0" anchor="ctr"/>
+          <a:lstStyle/>
+          <a:p>
+            <a:pPr algn="ctr"/>
+            <a:r>
+              <a:rPr lang="en-TW" dirty="0"/>
+              <a:t>Grand Challeges</a:t>
+            </a:r>
+          </a:p>
+        </p:txBody>
+      </p:sp>
+      <p:sp>
+        <p:nvSpPr>
+          <p:cNvPr id="5" name="Alternate Process 4">
+            <a:extLst>
+              <a:ext uri="{FF2B5EF4-FFF2-40B4-BE49-F238E27FC236}">
+                <a16:creationId xmlns:a16="http://schemas.microsoft.com/office/drawing/2014/main" id="{CDA7A0A4-2A5E-694B-9528-AC1C474D746B}"/>
+              </a:ext>
+            </a:extLst>
+          </p:cNvPr>
+          <p:cNvSpPr/>
+          <p:nvPr/>
+        </p:nvSpPr>
+        <p:spPr>
+          <a:xfrm>
+            <a:off x="282103" y="2493621"/>
+            <a:ext cx="1663430" cy="1870758"/>
+          </a:xfrm>
+          <a:prstGeom prst="flowChartAlternateProcess">
+            <a:avLst/>
+          </a:prstGeom>
+          <a:solidFill>
+            <a:srgbClr val="7030A0"/>
+          </a:solidFill>
+        </p:spPr>
+        <p:style>
+          <a:lnRef idx="2">
+            <a:schemeClr val="accent1">
+              <a:shade val="50000"/>
+            </a:schemeClr>
+          </a:lnRef>
+          <a:fillRef idx="1">
+            <a:schemeClr val="accent1"/>
+          </a:fillRef>
+          <a:effectRef idx="0">
+            <a:schemeClr val="accent1"/>
+          </a:effectRef>
+          <a:fontRef idx="minor">
+            <a:schemeClr val="lt1"/>
+          </a:fontRef>
+        </p:style>
+        <p:txBody>
+          <a:bodyPr rtlCol="0" anchor="ctr"/>
+          <a:lstStyle/>
+          <a:p>
+            <a:pPr algn="ctr"/>
+            <a:r>
+              <a:rPr lang="en-TW" dirty="0"/>
+              <a:t>HDX Success Recipe </a:t>
+            </a:r>
+          </a:p>
+          <a:p>
+            <a:pPr algn="ctr"/>
+            <a:r>
+              <a:rPr lang="en-TW" dirty="0"/>
+              <a:t>(Workflow Requirement)</a:t>
+            </a:r>
+          </a:p>
+        </p:txBody>
+      </p:sp>
+      <p:sp>
+        <p:nvSpPr>
+          <p:cNvPr id="6" name="Right Arrow 5">
+            <a:extLst>
+              <a:ext uri="{FF2B5EF4-FFF2-40B4-BE49-F238E27FC236}">
+                <a16:creationId xmlns:a16="http://schemas.microsoft.com/office/drawing/2014/main" id="{24BB5298-FCC7-DA4D-A598-403602362AF0}"/>
+              </a:ext>
+            </a:extLst>
+          </p:cNvPr>
+          <p:cNvSpPr/>
+          <p:nvPr/>
+        </p:nvSpPr>
+        <p:spPr>
+          <a:xfrm>
+            <a:off x="2519464" y="2633863"/>
+            <a:ext cx="7334655" cy="603115"/>
+          </a:xfrm>
+          <a:prstGeom prst="rightArrow">
+            <a:avLst/>
+          </a:prstGeom>
+          <a:solidFill>
+            <a:srgbClr val="7030A0">
+              <a:alpha val="19000"/>
+            </a:srgbClr>
+          </a:solidFill>
+          <a:ln>
+            <a:noFill/>
+          </a:ln>
+        </p:spPr>
+        <p:style>
+          <a:lnRef idx="2">
+            <a:schemeClr val="accent1">
+              <a:shade val="50000"/>
+            </a:schemeClr>
+          </a:lnRef>
+          <a:fillRef idx="1">
+            <a:schemeClr val="accent1"/>
+          </a:fillRef>
+          <a:effectRef idx="0">
+            <a:schemeClr val="accent1"/>
+          </a:effectRef>
+          <a:fontRef idx="minor">
+            <a:schemeClr val="lt1"/>
+          </a:fontRef>
+        </p:style>
+        <p:txBody>
+          <a:bodyPr rtlCol="0" anchor="ctr"/>
+          <a:lstStyle/>
+          <a:p>
+            <a:pPr algn="ctr"/>
+            <a:endParaRPr lang="en-TW"/>
+          </a:p>
+        </p:txBody>
+      </p:sp>
+      <p:sp>
+        <p:nvSpPr>
+          <p:cNvPr id="7" name="Left Arrow 6">
+            <a:extLst>
+              <a:ext uri="{FF2B5EF4-FFF2-40B4-BE49-F238E27FC236}">
+                <a16:creationId xmlns:a16="http://schemas.microsoft.com/office/drawing/2014/main" id="{364622DE-3D66-4746-BBD7-33DE9B2B50C2}"/>
+              </a:ext>
+            </a:extLst>
+          </p:cNvPr>
+          <p:cNvSpPr/>
+          <p:nvPr/>
+        </p:nvSpPr>
+        <p:spPr>
+          <a:xfrm>
+            <a:off x="2519464" y="3550794"/>
+            <a:ext cx="7062281" cy="612843"/>
+          </a:xfrm>
+          <a:prstGeom prst="leftArrow">
+            <a:avLst/>
+          </a:prstGeom>
+          <a:solidFill>
+            <a:srgbClr val="7030A0">
+              <a:alpha val="19000"/>
+            </a:srgbClr>
+          </a:solidFill>
+          <a:ln>
+            <a:noFill/>
+          </a:ln>
+        </p:spPr>
+        <p:style>
+          <a:lnRef idx="2">
+            <a:schemeClr val="accent1">
+              <a:shade val="50000"/>
+            </a:schemeClr>
+          </a:lnRef>
+          <a:fillRef idx="1">
+            <a:schemeClr val="accent1"/>
+          </a:fillRef>
+          <a:effectRef idx="0">
+            <a:schemeClr val="accent1"/>
+          </a:effectRef>
+          <a:fontRef idx="minor">
+            <a:schemeClr val="lt1"/>
+          </a:fontRef>
+        </p:style>
+        <p:txBody>
+          <a:bodyPr rtlCol="0" anchor="ctr"/>
+          <a:lstStyle/>
+          <a:p>
+            <a:pPr algn="ctr"/>
+            <a:endParaRPr lang="en-TW"/>
+          </a:p>
+        </p:txBody>
+      </p:sp>
+      <p:sp>
+        <p:nvSpPr>
+          <p:cNvPr id="8" name="TextBox 7">
+            <a:extLst>
+              <a:ext uri="{FF2B5EF4-FFF2-40B4-BE49-F238E27FC236}">
+                <a16:creationId xmlns:a16="http://schemas.microsoft.com/office/drawing/2014/main" id="{85B56F3F-462A-D74C-A29B-F83655E8C252}"/>
+              </a:ext>
+            </a:extLst>
+          </p:cNvPr>
+          <p:cNvSpPr txBox="1"/>
+          <p:nvPr/>
+        </p:nvSpPr>
+        <p:spPr>
+          <a:xfrm>
+            <a:off x="423981" y="1690459"/>
+            <a:ext cx="1379673" cy="646331"/>
+          </a:xfrm>
+          <a:prstGeom prst="rect">
+            <a:avLst/>
+          </a:prstGeom>
+          <a:noFill/>
+        </p:spPr>
+        <p:txBody>
+          <a:bodyPr wrap="none" rtlCol="0">
+            <a:spAutoFit/>
+          </a:bodyPr>
+          <a:lstStyle/>
+          <a:p>
+            <a:pPr algn="ctr"/>
+            <a:r>
+              <a:rPr lang="en-TW" dirty="0"/>
+              <a:t>Abstract</a:t>
+            </a:r>
+          </a:p>
+          <a:p>
+            <a:pPr algn="ctr"/>
+            <a:r>
+              <a:rPr lang="en-TW" dirty="0"/>
+              <a:t>Specification</a:t>
+            </a:r>
+          </a:p>
+        </p:txBody>
+      </p:sp>
+      <p:sp>
+        <p:nvSpPr>
+          <p:cNvPr id="9" name="TextBox 8">
+            <a:extLst>
+              <a:ext uri="{FF2B5EF4-FFF2-40B4-BE49-F238E27FC236}">
+                <a16:creationId xmlns:a16="http://schemas.microsoft.com/office/drawing/2014/main" id="{3FFE15E3-8053-1B40-9666-E1B628E1EAD0}"/>
+              </a:ext>
+            </a:extLst>
+          </p:cNvPr>
+          <p:cNvSpPr txBox="1"/>
+          <p:nvPr/>
+        </p:nvSpPr>
+        <p:spPr>
+          <a:xfrm>
+            <a:off x="10155336" y="1690458"/>
+            <a:ext cx="1692451" cy="646331"/>
+          </a:xfrm>
+          <a:prstGeom prst="rect">
+            <a:avLst/>
+          </a:prstGeom>
+          <a:noFill/>
+        </p:spPr>
+        <p:txBody>
+          <a:bodyPr wrap="none" rtlCol="0">
+            <a:spAutoFit/>
+          </a:bodyPr>
+          <a:lstStyle/>
+          <a:p>
+            <a:pPr algn="ctr"/>
+            <a:r>
+              <a:rPr lang="en-TW" dirty="0"/>
+              <a:t>Concrete</a:t>
+            </a:r>
+          </a:p>
+          <a:p>
+            <a:pPr algn="ctr"/>
+            <a:r>
+              <a:rPr lang="en-TW" dirty="0"/>
+              <a:t>Implementation</a:t>
+            </a:r>
+          </a:p>
+        </p:txBody>
+      </p:sp>
+    </p:spTree>
+    <p:extLst>
+      <p:ext uri="{BB962C8B-B14F-4D97-AF65-F5344CB8AC3E}">
+        <p14:creationId xmlns:p14="http://schemas.microsoft.com/office/powerpoint/2010/main" val="3875598524"/>
+      </p:ext>
+    </p:extLst>
+  </p:cSld>
+  <p:clrMapOvr>
+    <a:masterClrMapping/>
+  </p:clrMapOvr>
+</p:sld>
+</file>
+
+<file path=ppt/slides/slide11.xml><?xml version="1.0" encoding="utf-8"?>
 <p:sld xmlns:a="http://schemas.openxmlformats.org/drawingml/2006/main" xmlns:r="http://schemas.openxmlformats.org/officeDocument/2006/relationships" xmlns:p="http://schemas.openxmlformats.org/presentationml/2006/main">
   <p:cSld>
     <p:spTree>

</xml_diff>

<commit_message>
Improved HDX Secret Sauce slide
</commit_message>
<xml_diff>
--- a/docs/HDX_DesignChallenge.pptx
+++ b/docs/HDX_DesignChallenge.pptx
@@ -4736,7 +4736,7 @@
         </p:spPr>
         <p:txBody>
           <a:bodyPr>
-            <a:normAutofit/>
+            <a:normAutofit fontScale="90000"/>
           </a:bodyPr>
           <a:lstStyle/>
           <a:p>
@@ -4745,7 +4745,18 @@
               <a:rPr lang="en-US" sz="3600" dirty="0">
                 <a:latin typeface="+mn-lt"/>
               </a:rPr>
-              <a:t>HDX Secret Sauce: Separation of Requirement and Implementation</a:t>
+              <a:t>HDX Secret Sauce: </a:t>
+            </a:r>
+            <a:br>
+              <a:rPr lang="en-US" sz="3600" dirty="0">
+                <a:latin typeface="+mn-lt"/>
+              </a:rPr>
+            </a:br>
+            <a:r>
+              <a:rPr lang="en-US" sz="3600" dirty="0">
+                <a:latin typeface="+mn-lt"/>
+              </a:rPr>
+              <a:t>Separate Requirement from Implementation</a:t>
             </a:r>
           </a:p>
         </p:txBody>
@@ -4819,7 +4830,29 @@
                 <a:ea typeface="Calibri" panose="020F0502020204030204" pitchFamily="34" charset="0"/>
                 <a:cs typeface="Calibri" panose="020F0502020204030204" pitchFamily="34" charset="0"/>
               </a:rPr>
-              <a:t>This principle helps keep ”requirements” focused on logical properties of workflow, isolate interest conflicts that will naturally occur in real projects (Grand Challenges)</a:t>
+              <a:t>This principle helps keep ”requirements” focused on logical properties of workflow, isolate interest conflicts that will naturally occur in real projects (</a:t>
+            </a:r>
+            <a:r>
+              <a:rPr lang="en-US" sz="2400" b="1" i="1" dirty="0">
+                <a:solidFill>
+                  <a:srgbClr val="000000"/>
+                </a:solidFill>
+                <a:latin typeface="Montserrat Light" panose="00000400000000000000" pitchFamily="50" charset="0"/>
+                <a:ea typeface="Calibri" panose="020F0502020204030204" pitchFamily="34" charset="0"/>
+                <a:cs typeface="Calibri" panose="020F0502020204030204" pitchFamily="34" charset="0"/>
+              </a:rPr>
+              <a:t>Grand Challenges</a:t>
+            </a:r>
+            <a:r>
+              <a:rPr lang="en-US" sz="2400" dirty="0">
+                <a:solidFill>
+                  <a:srgbClr val="000000"/>
+                </a:solidFill>
+                <a:latin typeface="Montserrat Light" panose="00000400000000000000" pitchFamily="50" charset="0"/>
+                <a:ea typeface="Calibri" panose="020F0502020204030204" pitchFamily="34" charset="0"/>
+                <a:cs typeface="Calibri" panose="020F0502020204030204" pitchFamily="34" charset="0"/>
+              </a:rPr>
+              <a:t>)</a:t>
             </a:r>
           </a:p>
           <a:p>
@@ -4842,7 +4875,29 @@
                 <a:ea typeface="Calibri" panose="020F0502020204030204" pitchFamily="34" charset="0"/>
                 <a:cs typeface="Calibri" panose="020F0502020204030204" pitchFamily="34" charset="0"/>
               </a:rPr>
-              <a:t>The isolation helps keep requirements to be encoded in a vocabulary independent of specific applications  </a:t>
+              <a:t>The isolation helps keep requirements to be encoded in a </a:t>
+            </a:r>
+            <a:r>
+              <a:rPr lang="en-US" sz="2400" b="1" i="1" dirty="0">
+                <a:solidFill>
+                  <a:srgbClr val="000000"/>
+                </a:solidFill>
+                <a:latin typeface="Montserrat Light" panose="00000400000000000000" pitchFamily="50" charset="0"/>
+                <a:ea typeface="Calibri" panose="020F0502020204030204" pitchFamily="34" charset="0"/>
+                <a:cs typeface="Calibri" panose="020F0502020204030204" pitchFamily="34" charset="0"/>
+              </a:rPr>
+              <a:t>common vocabulary</a:t>
+            </a:r>
+            <a:r>
+              <a:rPr lang="en-US" sz="2400" dirty="0">
+                <a:solidFill>
+                  <a:srgbClr val="000000"/>
+                </a:solidFill>
+                <a:latin typeface="Montserrat Light" panose="00000400000000000000" pitchFamily="50" charset="0"/>
+                <a:ea typeface="Calibri" panose="020F0502020204030204" pitchFamily="34" charset="0"/>
+                <a:cs typeface="Calibri" panose="020F0502020204030204" pitchFamily="34" charset="0"/>
+              </a:rPr>
+              <a:t> independent of specific applications  </a:t>
             </a:r>
           </a:p>
           <a:p>
@@ -4857,7 +4912,7 @@
               <a:buAutoNum type="arabicPeriod"/>
             </a:pPr>
             <a:r>
-              <a:rPr lang="en-US" sz="2400" dirty="0">
+              <a:rPr lang="en-US" sz="2400" b="1" i="1" dirty="0">
                 <a:solidFill>
                   <a:srgbClr val="000000"/>
                 </a:solidFill>
@@ -4865,7 +4920,40 @@
                 <a:ea typeface="Calibri" panose="020F0502020204030204" pitchFamily="34" charset="0"/>
                 <a:cs typeface="Calibri" panose="020F0502020204030204" pitchFamily="34" charset="0"/>
               </a:rPr>
-              <a:t>Project Management is a general purpose skill, and should be independent of any applications.</a:t>
+              <a:t>Project Management </a:t>
+            </a:r>
+            <a:r>
+              <a:rPr lang="en-US" sz="2400" dirty="0">
+                <a:solidFill>
+                  <a:srgbClr val="000000"/>
+                </a:solidFill>
+                <a:latin typeface="Montserrat Light" panose="00000400000000000000" pitchFamily="50" charset="0"/>
+                <a:ea typeface="Calibri" panose="020F0502020204030204" pitchFamily="34" charset="0"/>
+                <a:cs typeface="Calibri" panose="020F0502020204030204" pitchFamily="34" charset="0"/>
+              </a:rPr>
+              <a:t>is a general purpose skill, or </a:t>
+            </a:r>
+            <a:r>
+              <a:rPr lang="en-US" sz="2400" b="1" i="1" dirty="0">
+                <a:solidFill>
+                  <a:srgbClr val="000000"/>
+                </a:solidFill>
+                <a:latin typeface="Montserrat Light" panose="00000400000000000000" pitchFamily="50" charset="0"/>
+                <a:ea typeface="Calibri" panose="020F0502020204030204" pitchFamily="34" charset="0"/>
+                <a:cs typeface="Calibri" panose="020F0502020204030204" pitchFamily="34" charset="0"/>
+              </a:rPr>
+              <a:t>meta-skill</a:t>
+            </a:r>
+            <a:r>
+              <a:rPr lang="en-US" sz="2400" dirty="0">
+                <a:solidFill>
+                  <a:srgbClr val="000000"/>
+                </a:solidFill>
+                <a:latin typeface="Montserrat Light" panose="00000400000000000000" pitchFamily="50" charset="0"/>
+                <a:ea typeface="Calibri" panose="020F0502020204030204" pitchFamily="34" charset="0"/>
+                <a:cs typeface="Calibri" panose="020F0502020204030204" pitchFamily="34" charset="0"/>
+              </a:rPr>
+              <a:t>, and should be independent of any applications.</a:t>
             </a:r>
           </a:p>
           <a:p>
@@ -4888,7 +4976,29 @@
                 <a:ea typeface="Calibri" panose="020F0502020204030204" pitchFamily="34" charset="0"/>
                 <a:cs typeface="Calibri" panose="020F0502020204030204" pitchFamily="34" charset="0"/>
               </a:rPr>
-              <a:t>This principle helps to share workflow management knowledge across application domains</a:t>
+              <a:t>This principle helps to </a:t>
+            </a:r>
+            <a:r>
+              <a:rPr lang="en-US" sz="2400" b="1" i="1" dirty="0">
+                <a:solidFill>
+                  <a:srgbClr val="000000"/>
+                </a:solidFill>
+                <a:latin typeface="Montserrat Light" panose="00000400000000000000" pitchFamily="50" charset="0"/>
+                <a:ea typeface="Calibri" panose="020F0502020204030204" pitchFamily="34" charset="0"/>
+                <a:cs typeface="Calibri" panose="020F0502020204030204" pitchFamily="34" charset="0"/>
+              </a:rPr>
+              <a:t>propagate workflow management knowledge</a:t>
+            </a:r>
+            <a:r>
+              <a:rPr lang="en-US" sz="2400" dirty="0">
+                <a:solidFill>
+                  <a:srgbClr val="000000"/>
+                </a:solidFill>
+                <a:latin typeface="Montserrat Light" panose="00000400000000000000" pitchFamily="50" charset="0"/>
+                <a:ea typeface="Calibri" panose="020F0502020204030204" pitchFamily="34" charset="0"/>
+                <a:cs typeface="Calibri" panose="020F0502020204030204" pitchFamily="34" charset="0"/>
+              </a:rPr>
+              <a:t> across application domains</a:t>
             </a:r>
           </a:p>
           <a:p>
@@ -4911,7 +5021,18 @@
                 <a:ea typeface="Calibri" panose="020F0502020204030204" pitchFamily="34" charset="0"/>
                 <a:cs typeface="Calibri" panose="020F0502020204030204" pitchFamily="34" charset="0"/>
               </a:rPr>
-              <a:t>All future KKB projects should leverage a common digital workflow requirement</a:t>
+              <a:t>All future KKB projects should leverage a version-controlled </a:t>
+            </a:r>
+            <a:r>
+              <a:rPr lang="en-US" sz="2400" b="1" i="1" dirty="0">
+                <a:solidFill>
+                  <a:srgbClr val="000000"/>
+                </a:solidFill>
+                <a:latin typeface="Montserrat Light" panose="00000400000000000000" pitchFamily="50" charset="0"/>
+                <a:ea typeface="Calibri" panose="020F0502020204030204" pitchFamily="34" charset="0"/>
+                <a:cs typeface="Calibri" panose="020F0502020204030204" pitchFamily="34" charset="0"/>
+              </a:rPr>
+              <a:t>standard digital workflow requirement</a:t>
             </a:r>
           </a:p>
         </p:txBody>
@@ -5096,7 +5217,7 @@
         <p:spPr>
           <a:xfrm>
             <a:off x="2519464" y="3550794"/>
-            <a:ext cx="7062281" cy="612843"/>
+            <a:ext cx="7334655" cy="612843"/>
           </a:xfrm>
           <a:prstGeom prst="leftArrow">
             <a:avLst/>

</xml_diff>

<commit_message>
Create a Self-Modifying Digital Workflow in 2 Days
</commit_message>
<xml_diff>
--- a/docs/HDX_DesignChallenge.pptx
+++ b/docs/HDX_DesignChallenge.pptx
@@ -3812,8 +3812,8 @@
         </p:nvSpPr>
         <p:spPr>
           <a:xfrm>
-            <a:off x="2209800" y="276974"/>
-            <a:ext cx="7772400" cy="699210"/>
+            <a:off x="2209800" y="5384"/>
+            <a:ext cx="7772400" cy="1416888"/>
           </a:xfrm>
         </p:spPr>
         <p:txBody>
@@ -3826,6 +3826,14 @@
               <a:rPr lang="en-US" dirty="0"/>
               <a:t>HDX Design Challenge</a:t>
             </a:r>
+            <a:br>
+              <a:rPr lang="en-US" dirty="0"/>
+            </a:br>
+            <a:r>
+              <a:rPr lang="en-US" sz="3100" dirty="0"/>
+              <a:t>Creating a self-modifying digital workflow in 2 days</a:t>
+            </a:r>
+            <a:endParaRPr lang="en-US" dirty="0"/>
           </a:p>
         </p:txBody>
       </p:sp>
@@ -4662,7 +4670,7 @@
         <p:spPr>
           <a:xfrm>
             <a:off x="3892378" y="6297805"/>
-            <a:ext cx="4764509" cy="369332"/>
+            <a:ext cx="4905574" cy="369332"/>
           </a:xfrm>
           <a:prstGeom prst="rect">
             <a:avLst/>
@@ -4677,7 +4685,7 @@
           <a:p>
             <a:r>
               <a:rPr lang="en-TW" dirty="0"/>
-              <a:t>Piloting the Pilot HDX 2021 Certification Program</a:t>
+              <a:t>HDX 2021 (Piloting the Pilot) Certification Program</a:t>
             </a:r>
           </a:p>
         </p:txBody>

</xml_diff>

<commit_message>
Change one slide with Sherly
</commit_message>
<xml_diff>
--- a/docs/HDX_DesignChallenge.pptx
+++ b/docs/HDX_DesignChallenge.pptx
@@ -207,7 +207,7 @@
           <a:p>
             <a:fld id="{C5FDEB15-2BC0-364C-8BA2-B7E55B0CE1AC}" type="datetimeFigureOut">
               <a:rPr lang="en-TW" smtClean="0"/>
-              <a:t>2020/11/18</a:t>
+              <a:t>11/20/20</a:t>
             </a:fld>
             <a:endParaRPr lang="en-TW"/>
           </a:p>
@@ -708,7 +708,7 @@
           <a:p>
             <a:fld id="{1659D634-48EB-8C4E-ADAD-D248976EB132}" type="datetimeFigureOut">
               <a:rPr lang="en-TW" smtClean="0"/>
-              <a:t>2020/11/18</a:t>
+              <a:t>11/20/20</a:t>
             </a:fld>
             <a:endParaRPr lang="en-TW"/>
           </a:p>
@@ -908,7 +908,7 @@
           <a:p>
             <a:fld id="{1659D634-48EB-8C4E-ADAD-D248976EB132}" type="datetimeFigureOut">
               <a:rPr lang="en-TW" smtClean="0"/>
-              <a:t>2020/11/18</a:t>
+              <a:t>11/20/20</a:t>
             </a:fld>
             <a:endParaRPr lang="en-TW"/>
           </a:p>
@@ -1118,7 +1118,7 @@
           <a:p>
             <a:fld id="{1659D634-48EB-8C4E-ADAD-D248976EB132}" type="datetimeFigureOut">
               <a:rPr lang="en-TW" smtClean="0"/>
-              <a:t>2020/11/18</a:t>
+              <a:t>11/20/20</a:t>
             </a:fld>
             <a:endParaRPr lang="en-TW"/>
           </a:p>
@@ -1318,7 +1318,7 @@
           <a:p>
             <a:fld id="{1659D634-48EB-8C4E-ADAD-D248976EB132}" type="datetimeFigureOut">
               <a:rPr lang="en-TW" smtClean="0"/>
-              <a:t>2020/11/18</a:t>
+              <a:t>11/20/20</a:t>
             </a:fld>
             <a:endParaRPr lang="en-TW"/>
           </a:p>
@@ -1594,7 +1594,7 @@
           <a:p>
             <a:fld id="{1659D634-48EB-8C4E-ADAD-D248976EB132}" type="datetimeFigureOut">
               <a:rPr lang="en-TW" smtClean="0"/>
-              <a:t>2020/11/18</a:t>
+              <a:t>11/20/20</a:t>
             </a:fld>
             <a:endParaRPr lang="en-TW"/>
           </a:p>
@@ -1862,7 +1862,7 @@
           <a:p>
             <a:fld id="{1659D634-48EB-8C4E-ADAD-D248976EB132}" type="datetimeFigureOut">
               <a:rPr lang="en-TW" smtClean="0"/>
-              <a:t>2020/11/18</a:t>
+              <a:t>11/20/20</a:t>
             </a:fld>
             <a:endParaRPr lang="en-TW"/>
           </a:p>
@@ -2277,7 +2277,7 @@
           <a:p>
             <a:fld id="{1659D634-48EB-8C4E-ADAD-D248976EB132}" type="datetimeFigureOut">
               <a:rPr lang="en-TW" smtClean="0"/>
-              <a:t>2020/11/18</a:t>
+              <a:t>11/20/20</a:t>
             </a:fld>
             <a:endParaRPr lang="en-TW"/>
           </a:p>
@@ -2419,7 +2419,7 @@
           <a:p>
             <a:fld id="{1659D634-48EB-8C4E-ADAD-D248976EB132}" type="datetimeFigureOut">
               <a:rPr lang="en-TW" smtClean="0"/>
-              <a:t>2020/11/18</a:t>
+              <a:t>11/20/20</a:t>
             </a:fld>
             <a:endParaRPr lang="en-TW"/>
           </a:p>
@@ -2532,7 +2532,7 @@
           <a:p>
             <a:fld id="{1659D634-48EB-8C4E-ADAD-D248976EB132}" type="datetimeFigureOut">
               <a:rPr lang="en-TW" smtClean="0"/>
-              <a:t>2020/11/18</a:t>
+              <a:t>11/20/20</a:t>
             </a:fld>
             <a:endParaRPr lang="en-TW"/>
           </a:p>
@@ -2845,7 +2845,7 @@
           <a:p>
             <a:fld id="{1659D634-48EB-8C4E-ADAD-D248976EB132}" type="datetimeFigureOut">
               <a:rPr lang="en-TW" smtClean="0"/>
-              <a:t>2020/11/18</a:t>
+              <a:t>11/20/20</a:t>
             </a:fld>
             <a:endParaRPr lang="en-TW"/>
           </a:p>
@@ -3134,7 +3134,7 @@
           <a:p>
             <a:fld id="{1659D634-48EB-8C4E-ADAD-D248976EB132}" type="datetimeFigureOut">
               <a:rPr lang="en-TW" smtClean="0"/>
-              <a:t>2020/11/18</a:t>
+              <a:t>11/20/20</a:t>
             </a:fld>
             <a:endParaRPr lang="en-TW"/>
           </a:p>
@@ -3377,7 +3377,7 @@
           <a:p>
             <a:fld id="{1659D634-48EB-8C4E-ADAD-D248976EB132}" type="datetimeFigureOut">
               <a:rPr lang="en-TW" smtClean="0"/>
-              <a:t>2020/11/18</a:t>
+              <a:t>11/20/20</a:t>
             </a:fld>
             <a:endParaRPr lang="en-TW"/>
           </a:p>
@@ -6505,8 +6505,27 @@
                 <a:ea typeface="Calibri" panose="020F0502020204030204" pitchFamily="34" charset="0"/>
                 <a:cs typeface="Calibri" panose="020F0502020204030204" pitchFamily="34" charset="0"/>
               </a:rPr>
-              <a:t> digital collaboration tools.</a:t>
-            </a:r>
+              <a:t> digital </a:t>
+            </a:r>
+            <a:r>
+              <a:rPr lang="en-US" sz="4400">
+                <a:solidFill>
+                  <a:srgbClr val="000000"/>
+                </a:solidFill>
+                <a:latin typeface="Montserrat Light" panose="00000400000000000000" pitchFamily="50" charset="0"/>
+                <a:ea typeface="Calibri" panose="020F0502020204030204" pitchFamily="34" charset="0"/>
+                <a:cs typeface="Calibri" panose="020F0502020204030204" pitchFamily="34" charset="0"/>
+              </a:rPr>
+              <a:t>collaboration tools…</a:t>
+            </a:r>
+            <a:endParaRPr lang="en-US" sz="4400" dirty="0">
+              <a:solidFill>
+                <a:srgbClr val="000000"/>
+              </a:solidFill>
+              <a:latin typeface="Montserrat Light" panose="00000400000000000000" pitchFamily="50" charset="0"/>
+              <a:ea typeface="Calibri" panose="020F0502020204030204" pitchFamily="34" charset="0"/>
+              <a:cs typeface="Calibri" panose="020F0502020204030204" pitchFamily="34" charset="0"/>
+            </a:endParaRPr>
           </a:p>
         </p:txBody>
       </p:sp>

</xml_diff>